<commit_message>
- powerpoint slides updated
</commit_message>
<xml_diff>
--- a/_doc/Presentation/Slides.pptx
+++ b/_doc/Presentation/Slides.pptx
@@ -250,7 +250,7 @@
           <a:p>
             <a:fld id="{94B80795-348F-48B3-A8F3-23E43526E2BC}" type="datetimeFigureOut">
               <a:rPr lang="de-CH" smtClean="0"/>
-              <a:t>07.12.2015</a:t>
+              <a:t>08.12.2015</a:t>
             </a:fld>
             <a:endParaRPr lang="de-CH"/>
           </a:p>
@@ -420,7 +420,7 @@
           <a:p>
             <a:fld id="{94B80795-348F-48B3-A8F3-23E43526E2BC}" type="datetimeFigureOut">
               <a:rPr lang="de-CH" smtClean="0"/>
-              <a:t>07.12.2015</a:t>
+              <a:t>08.12.2015</a:t>
             </a:fld>
             <a:endParaRPr lang="de-CH"/>
           </a:p>
@@ -600,7 +600,7 @@
           <a:p>
             <a:fld id="{94B80795-348F-48B3-A8F3-23E43526E2BC}" type="datetimeFigureOut">
               <a:rPr lang="de-CH" smtClean="0"/>
-              <a:t>07.12.2015</a:t>
+              <a:t>08.12.2015</a:t>
             </a:fld>
             <a:endParaRPr lang="de-CH"/>
           </a:p>
@@ -770,7 +770,7 @@
           <a:p>
             <a:fld id="{94B80795-348F-48B3-A8F3-23E43526E2BC}" type="datetimeFigureOut">
               <a:rPr lang="de-CH" smtClean="0"/>
-              <a:t>07.12.2015</a:t>
+              <a:t>08.12.2015</a:t>
             </a:fld>
             <a:endParaRPr lang="de-CH"/>
           </a:p>
@@ -1016,7 +1016,7 @@
           <a:p>
             <a:fld id="{94B80795-348F-48B3-A8F3-23E43526E2BC}" type="datetimeFigureOut">
               <a:rPr lang="de-CH" smtClean="0"/>
-              <a:t>07.12.2015</a:t>
+              <a:t>08.12.2015</a:t>
             </a:fld>
             <a:endParaRPr lang="de-CH"/>
           </a:p>
@@ -1248,7 +1248,7 @@
           <a:p>
             <a:fld id="{94B80795-348F-48B3-A8F3-23E43526E2BC}" type="datetimeFigureOut">
               <a:rPr lang="de-CH" smtClean="0"/>
-              <a:t>07.12.2015</a:t>
+              <a:t>08.12.2015</a:t>
             </a:fld>
             <a:endParaRPr lang="de-CH"/>
           </a:p>
@@ -1615,7 +1615,7 @@
           <a:p>
             <a:fld id="{94B80795-348F-48B3-A8F3-23E43526E2BC}" type="datetimeFigureOut">
               <a:rPr lang="de-CH" smtClean="0"/>
-              <a:t>07.12.2015</a:t>
+              <a:t>08.12.2015</a:t>
             </a:fld>
             <a:endParaRPr lang="de-CH"/>
           </a:p>
@@ -1733,7 +1733,7 @@
           <a:p>
             <a:fld id="{94B80795-348F-48B3-A8F3-23E43526E2BC}" type="datetimeFigureOut">
               <a:rPr lang="de-CH" smtClean="0"/>
-              <a:t>07.12.2015</a:t>
+              <a:t>08.12.2015</a:t>
             </a:fld>
             <a:endParaRPr lang="de-CH"/>
           </a:p>
@@ -1828,7 +1828,7 @@
           <a:p>
             <a:fld id="{94B80795-348F-48B3-A8F3-23E43526E2BC}" type="datetimeFigureOut">
               <a:rPr lang="de-CH" smtClean="0"/>
-              <a:t>07.12.2015</a:t>
+              <a:t>08.12.2015</a:t>
             </a:fld>
             <a:endParaRPr lang="de-CH"/>
           </a:p>
@@ -2105,7 +2105,7 @@
           <a:p>
             <a:fld id="{94B80795-348F-48B3-A8F3-23E43526E2BC}" type="datetimeFigureOut">
               <a:rPr lang="de-CH" smtClean="0"/>
-              <a:t>07.12.2015</a:t>
+              <a:t>08.12.2015</a:t>
             </a:fld>
             <a:endParaRPr lang="de-CH"/>
           </a:p>
@@ -2358,7 +2358,7 @@
           <a:p>
             <a:fld id="{94B80795-348F-48B3-A8F3-23E43526E2BC}" type="datetimeFigureOut">
               <a:rPr lang="de-CH" smtClean="0"/>
-              <a:t>07.12.2015</a:t>
+              <a:t>08.12.2015</a:t>
             </a:fld>
             <a:endParaRPr lang="de-CH"/>
           </a:p>
@@ -2581,7 +2581,7 @@
           <a:p>
             <a:fld id="{94B80795-348F-48B3-A8F3-23E43526E2BC}" type="datetimeFigureOut">
               <a:rPr lang="de-CH" smtClean="0"/>
-              <a:t>07.12.2015</a:t>
+              <a:t>08.12.2015</a:t>
             </a:fld>
             <a:endParaRPr lang="de-CH"/>
           </a:p>
@@ -5904,7 +5904,9 @@
         </p:nvSpPr>
         <p:spPr/>
         <p:txBody>
-          <a:bodyPr/>
+          <a:bodyPr>
+            <a:normAutofit lnSpcReduction="10000"/>
+          </a:bodyPr>
           <a:lstStyle/>
           <a:p>
             <a:r>
@@ -5963,8 +5965,28 @@
             </a:r>
             <a:r>
               <a:rPr lang="de-CH" dirty="0" smtClean="0"/>
-              <a:t> Files</a:t>
-            </a:r>
+              <a:t> </a:t>
+            </a:r>
+            <a:r>
+              <a:rPr lang="de-CH" dirty="0" smtClean="0"/>
+              <a:t>Files</a:t>
+            </a:r>
+          </a:p>
+          <a:p>
+            <a:pPr lvl="1"/>
+            <a:r>
+              <a:rPr lang="en-GB" dirty="0" err="1" smtClean="0"/>
+              <a:t>Modulare</a:t>
+            </a:r>
+            <a:r>
+              <a:rPr lang="en-GB" dirty="0" smtClean="0"/>
+              <a:t> Chat </a:t>
+            </a:r>
+            <a:r>
+              <a:rPr lang="en-GB" dirty="0" err="1" smtClean="0"/>
+              <a:t>Direktive</a:t>
+            </a:r>
+            <a:endParaRPr lang="de-CH" dirty="0" smtClean="0"/>
           </a:p>
           <a:p>
             <a:r>
@@ -6008,6 +6030,33 @@
             <a:r>
               <a:rPr lang="de-CH" dirty="0" smtClean="0"/>
               <a:t>-Module</a:t>
+            </a:r>
+          </a:p>
+          <a:p>
+            <a:pPr lvl="1"/>
+            <a:r>
+              <a:rPr lang="en-GB" dirty="0" err="1" smtClean="0"/>
+              <a:t>Oauth</a:t>
+            </a:r>
+            <a:r>
+              <a:rPr lang="en-GB" dirty="0" smtClean="0"/>
+              <a:t> </a:t>
+            </a:r>
+            <a:r>
+              <a:rPr lang="en-GB" dirty="0" err="1" smtClean="0"/>
+              <a:t>mit</a:t>
+            </a:r>
+            <a:r>
+              <a:rPr lang="en-GB" dirty="0" smtClean="0"/>
+              <a:t> Twitter (</a:t>
+            </a:r>
+            <a:r>
+              <a:rPr lang="en-GB" dirty="0" err="1" smtClean="0"/>
+              <a:t>Prototyp</a:t>
+            </a:r>
+            <a:r>
+              <a:rPr lang="en-GB" dirty="0" smtClean="0"/>
+              <a:t>)</a:t>
             </a:r>
             <a:endParaRPr lang="de-CH" dirty="0"/>
           </a:p>
@@ -6164,8 +6213,14 @@
             </a:r>
             <a:r>
               <a:rPr lang="de-CH" dirty="0" smtClean="0"/>
-              <a:t>, Security)</a:t>
-            </a:r>
+              <a:t>, Security</a:t>
+            </a:r>
+            <a:r>
+              <a:rPr lang="de-CH" dirty="0" smtClean="0"/>
+              <a:t>)</a:t>
+            </a:r>
+          </a:p>
+          <a:p>
             <a:endParaRPr lang="de-CH" dirty="0"/>
           </a:p>
         </p:txBody>

</xml_diff>